<commit_message>
added mockup pdf with minor improvements
</commit_message>
<xml_diff>
--- a/Documentation/amos_mockup.pptx
+++ b/Documentation/amos_mockup.pptx
@@ -117,10 +117,18 @@
 </p:presentation>
 </file>
 
+<file path=ppt/revisionInfo.xml><?xml version="1.0" encoding="utf-8"?>
+<p1510:revInfo xmlns:a="http://schemas.openxmlformats.org/drawingml/2006/main" xmlns:r="http://schemas.openxmlformats.org/officeDocument/2006/relationships" xmlns:p1510="http://schemas.microsoft.com/office/powerpoint/2015/10/main">
+  <p1510:revLst>
+    <p1510:client id="{7CA16CA7-D043-400C-9926-E7B15DC6E140}" v="35" dt="2023-05-09T16:01:59.090"/>
+  </p1510:revLst>
+</p1510:revInfo>
+</file>
+
 <file path=ppt/charts/chart1.xml><?xml version="1.0" encoding="utf-8"?>
 <c:chartSpace xmlns:c="http://schemas.openxmlformats.org/drawingml/2006/chart" xmlns:a="http://schemas.openxmlformats.org/drawingml/2006/main" xmlns:r="http://schemas.openxmlformats.org/officeDocument/2006/relationships" xmlns:c16r2="http://schemas.microsoft.com/office/drawing/2015/06/chart">
   <c:date1904 val="0"/>
-  <c:lang val="de-DE"/>
+  <c:lang val="en-US"/>
   <c:roundedCorners val="0"/>
   <mc:AlternateContent xmlns:mc="http://schemas.openxmlformats.org/markup-compatibility/2006">
     <mc:Choice xmlns:c14="http://schemas.microsoft.com/office/drawing/2007/8/2/chart" Requires="c14">
@@ -322,7 +330,7 @@
 <file path=ppt/charts/chart10.xml><?xml version="1.0" encoding="utf-8"?>
 <c:chartSpace xmlns:c="http://schemas.openxmlformats.org/drawingml/2006/chart" xmlns:a="http://schemas.openxmlformats.org/drawingml/2006/main" xmlns:r="http://schemas.openxmlformats.org/officeDocument/2006/relationships" xmlns:c16r2="http://schemas.microsoft.com/office/drawing/2015/06/chart">
   <c:date1904 val="0"/>
-  <c:lang val="de-DE"/>
+  <c:lang val="en-US"/>
   <c:roundedCorners val="0"/>
   <mc:AlternateContent xmlns:mc="http://schemas.openxmlformats.org/markup-compatibility/2006">
     <mc:Choice xmlns:c14="http://schemas.microsoft.com/office/drawing/2007/8/2/chart" Requires="c14">
@@ -524,7 +532,7 @@
 <file path=ppt/charts/chart11.xml><?xml version="1.0" encoding="utf-8"?>
 <c:chartSpace xmlns:c="http://schemas.openxmlformats.org/drawingml/2006/chart" xmlns:a="http://schemas.openxmlformats.org/drawingml/2006/main" xmlns:r="http://schemas.openxmlformats.org/officeDocument/2006/relationships" xmlns:c16r2="http://schemas.microsoft.com/office/drawing/2015/06/chart">
   <c:date1904 val="0"/>
-  <c:lang val="de-DE"/>
+  <c:lang val="en-US"/>
   <c:roundedCorners val="0"/>
   <mc:AlternateContent xmlns:mc="http://schemas.openxmlformats.org/markup-compatibility/2006">
     <mc:Choice xmlns:c14="http://schemas.microsoft.com/office/drawing/2007/8/2/chart" Requires="c14">
@@ -726,7 +734,7 @@
 <file path=ppt/charts/chart12.xml><?xml version="1.0" encoding="utf-8"?>
 <c:chartSpace xmlns:c="http://schemas.openxmlformats.org/drawingml/2006/chart" xmlns:a="http://schemas.openxmlformats.org/drawingml/2006/main" xmlns:r="http://schemas.openxmlformats.org/officeDocument/2006/relationships" xmlns:c16r2="http://schemas.microsoft.com/office/drawing/2015/06/chart">
   <c:date1904 val="0"/>
-  <c:lang val="de-DE"/>
+  <c:lang val="en-US"/>
   <c:roundedCorners val="0"/>
   <mc:AlternateContent xmlns:mc="http://schemas.openxmlformats.org/markup-compatibility/2006">
     <mc:Choice xmlns:c14="http://schemas.microsoft.com/office/drawing/2007/8/2/chart" Requires="c14">
@@ -1099,7 +1107,7 @@
 <file path=ppt/charts/chart13.xml><?xml version="1.0" encoding="utf-8"?>
 <c:chartSpace xmlns:c="http://schemas.openxmlformats.org/drawingml/2006/chart" xmlns:a="http://schemas.openxmlformats.org/drawingml/2006/main" xmlns:r="http://schemas.openxmlformats.org/officeDocument/2006/relationships" xmlns:c16r2="http://schemas.microsoft.com/office/drawing/2015/06/chart">
   <c:date1904 val="0"/>
-  <c:lang val="de-DE"/>
+  <c:lang val="en-US"/>
   <c:roundedCorners val="0"/>
   <mc:AlternateContent xmlns:mc="http://schemas.openxmlformats.org/markup-compatibility/2006">
     <mc:Choice xmlns:c14="http://schemas.microsoft.com/office/drawing/2007/8/2/chart" Requires="c14">
@@ -1301,7 +1309,7 @@
 <file path=ppt/charts/chart14.xml><?xml version="1.0" encoding="utf-8"?>
 <c:chartSpace xmlns:c="http://schemas.openxmlformats.org/drawingml/2006/chart" xmlns:a="http://schemas.openxmlformats.org/drawingml/2006/main" xmlns:r="http://schemas.openxmlformats.org/officeDocument/2006/relationships" xmlns:c16r2="http://schemas.microsoft.com/office/drawing/2015/06/chart">
   <c:date1904 val="0"/>
-  <c:lang val="de-DE"/>
+  <c:lang val="en-US"/>
   <c:roundedCorners val="0"/>
   <mc:AlternateContent xmlns:mc="http://schemas.openxmlformats.org/markup-compatibility/2006">
     <mc:Choice xmlns:c14="http://schemas.microsoft.com/office/drawing/2007/8/2/chart" Requires="c14">
@@ -1503,7 +1511,7 @@
 <file path=ppt/charts/chart15.xml><?xml version="1.0" encoding="utf-8"?>
 <c:chartSpace xmlns:c="http://schemas.openxmlformats.org/drawingml/2006/chart" xmlns:a="http://schemas.openxmlformats.org/drawingml/2006/main" xmlns:r="http://schemas.openxmlformats.org/officeDocument/2006/relationships" xmlns:c16r2="http://schemas.microsoft.com/office/drawing/2015/06/chart">
   <c:date1904 val="0"/>
-  <c:lang val="de-DE"/>
+  <c:lang val="en-US"/>
   <c:roundedCorners val="0"/>
   <mc:AlternateContent xmlns:mc="http://schemas.openxmlformats.org/markup-compatibility/2006">
     <mc:Choice xmlns:c14="http://schemas.microsoft.com/office/drawing/2007/8/2/chart" Requires="c14">
@@ -1866,7 +1874,7 @@
 <file path=ppt/charts/chart16.xml><?xml version="1.0" encoding="utf-8"?>
 <c:chartSpace xmlns:c="http://schemas.openxmlformats.org/drawingml/2006/chart" xmlns:a="http://schemas.openxmlformats.org/drawingml/2006/main" xmlns:r="http://schemas.openxmlformats.org/officeDocument/2006/relationships" xmlns:c16r2="http://schemas.microsoft.com/office/drawing/2015/06/chart">
   <c:date1904 val="0"/>
-  <c:lang val="de-DE"/>
+  <c:lang val="en-US"/>
   <c:roundedCorners val="0"/>
   <mc:AlternateContent xmlns:mc="http://schemas.openxmlformats.org/markup-compatibility/2006">
     <mc:Choice xmlns:c14="http://schemas.microsoft.com/office/drawing/2007/8/2/chart" Requires="c14">
@@ -2068,7 +2076,7 @@
 <file path=ppt/charts/chart17.xml><?xml version="1.0" encoding="utf-8"?>
 <c:chartSpace xmlns:c="http://schemas.openxmlformats.org/drawingml/2006/chart" xmlns:a="http://schemas.openxmlformats.org/drawingml/2006/main" xmlns:r="http://schemas.openxmlformats.org/officeDocument/2006/relationships" xmlns:c16r2="http://schemas.microsoft.com/office/drawing/2015/06/chart">
   <c:date1904 val="0"/>
-  <c:lang val="de-DE"/>
+  <c:lang val="en-US"/>
   <c:roundedCorners val="0"/>
   <mc:AlternateContent xmlns:mc="http://schemas.openxmlformats.org/markup-compatibility/2006">
     <mc:Choice xmlns:c14="http://schemas.microsoft.com/office/drawing/2007/8/2/chart" Requires="c14">
@@ -2270,7 +2278,7 @@
 <file path=ppt/charts/chart18.xml><?xml version="1.0" encoding="utf-8"?>
 <c:chartSpace xmlns:c="http://schemas.openxmlformats.org/drawingml/2006/chart" xmlns:a="http://schemas.openxmlformats.org/drawingml/2006/main" xmlns:r="http://schemas.openxmlformats.org/officeDocument/2006/relationships" xmlns:c16r2="http://schemas.microsoft.com/office/drawing/2015/06/chart">
   <c:date1904 val="0"/>
-  <c:lang val="de-DE"/>
+  <c:lang val="en-US"/>
   <c:roundedCorners val="0"/>
   <mc:AlternateContent xmlns:mc="http://schemas.openxmlformats.org/markup-compatibility/2006">
     <mc:Choice xmlns:c14="http://schemas.microsoft.com/office/drawing/2007/8/2/chart" Requires="c14">
@@ -2633,7 +2641,7 @@
 <file path=ppt/charts/chart19.xml><?xml version="1.0" encoding="utf-8"?>
 <c:chartSpace xmlns:c="http://schemas.openxmlformats.org/drawingml/2006/chart" xmlns:a="http://schemas.openxmlformats.org/drawingml/2006/main" xmlns:r="http://schemas.openxmlformats.org/officeDocument/2006/relationships" xmlns:c16r2="http://schemas.microsoft.com/office/drawing/2015/06/chart">
   <c:date1904 val="0"/>
-  <c:lang val="de-DE"/>
+  <c:lang val="en-US"/>
   <c:roundedCorners val="0"/>
   <mc:AlternateContent xmlns:mc="http://schemas.openxmlformats.org/markup-compatibility/2006">
     <mc:Choice xmlns:c14="http://schemas.microsoft.com/office/drawing/2007/8/2/chart" Requires="c14">
@@ -2835,7 +2843,7 @@
 <file path=ppt/charts/chart2.xml><?xml version="1.0" encoding="utf-8"?>
 <c:chartSpace xmlns:c="http://schemas.openxmlformats.org/drawingml/2006/chart" xmlns:a="http://schemas.openxmlformats.org/drawingml/2006/main" xmlns:r="http://schemas.openxmlformats.org/officeDocument/2006/relationships" xmlns:c16r2="http://schemas.microsoft.com/office/drawing/2015/06/chart">
   <c:date1904 val="0"/>
-  <c:lang val="de-DE"/>
+  <c:lang val="en-US"/>
   <c:roundedCorners val="0"/>
   <mc:AlternateContent xmlns:mc="http://schemas.openxmlformats.org/markup-compatibility/2006">
     <mc:Choice xmlns:c14="http://schemas.microsoft.com/office/drawing/2007/8/2/chart" Requires="c14">
@@ -3037,7 +3045,7 @@
 <file path=ppt/charts/chart20.xml><?xml version="1.0" encoding="utf-8"?>
 <c:chartSpace xmlns:c="http://schemas.openxmlformats.org/drawingml/2006/chart" xmlns:a="http://schemas.openxmlformats.org/drawingml/2006/main" xmlns:r="http://schemas.openxmlformats.org/officeDocument/2006/relationships" xmlns:c16r2="http://schemas.microsoft.com/office/drawing/2015/06/chart">
   <c:date1904 val="0"/>
-  <c:lang val="de-DE"/>
+  <c:lang val="en-US"/>
   <c:roundedCorners val="0"/>
   <mc:AlternateContent xmlns:mc="http://schemas.openxmlformats.org/markup-compatibility/2006">
     <mc:Choice xmlns:c14="http://schemas.microsoft.com/office/drawing/2007/8/2/chart" Requires="c14">
@@ -3239,7 +3247,7 @@
 <file path=ppt/charts/chart21.xml><?xml version="1.0" encoding="utf-8"?>
 <c:chartSpace xmlns:c="http://schemas.openxmlformats.org/drawingml/2006/chart" xmlns:a="http://schemas.openxmlformats.org/drawingml/2006/main" xmlns:r="http://schemas.openxmlformats.org/officeDocument/2006/relationships" xmlns:c16r2="http://schemas.microsoft.com/office/drawing/2015/06/chart">
   <c:date1904 val="0"/>
-  <c:lang val="de-DE"/>
+  <c:lang val="en-US"/>
   <c:roundedCorners val="0"/>
   <mc:AlternateContent xmlns:mc="http://schemas.openxmlformats.org/markup-compatibility/2006">
     <mc:Choice xmlns:c14="http://schemas.microsoft.com/office/drawing/2007/8/2/chart" Requires="c14">
@@ -3602,7 +3610,7 @@
 <file path=ppt/charts/chart22.xml><?xml version="1.0" encoding="utf-8"?>
 <c:chartSpace xmlns:c="http://schemas.openxmlformats.org/drawingml/2006/chart" xmlns:a="http://schemas.openxmlformats.org/drawingml/2006/main" xmlns:r="http://schemas.openxmlformats.org/officeDocument/2006/relationships" xmlns:c16r2="http://schemas.microsoft.com/office/drawing/2015/06/chart">
   <c:date1904 val="0"/>
-  <c:lang val="de-DE"/>
+  <c:lang val="en-US"/>
   <c:roundedCorners val="0"/>
   <mc:AlternateContent xmlns:mc="http://schemas.openxmlformats.org/markup-compatibility/2006">
     <mc:Choice xmlns:c14="http://schemas.microsoft.com/office/drawing/2007/8/2/chart" Requires="c14">
@@ -3804,7 +3812,7 @@
 <file path=ppt/charts/chart23.xml><?xml version="1.0" encoding="utf-8"?>
 <c:chartSpace xmlns:c="http://schemas.openxmlformats.org/drawingml/2006/chart" xmlns:a="http://schemas.openxmlformats.org/drawingml/2006/main" xmlns:r="http://schemas.openxmlformats.org/officeDocument/2006/relationships" xmlns:c16r2="http://schemas.microsoft.com/office/drawing/2015/06/chart">
   <c:date1904 val="0"/>
-  <c:lang val="de-DE"/>
+  <c:lang val="en-US"/>
   <c:roundedCorners val="0"/>
   <mc:AlternateContent xmlns:mc="http://schemas.openxmlformats.org/markup-compatibility/2006">
     <mc:Choice xmlns:c14="http://schemas.microsoft.com/office/drawing/2007/8/2/chart" Requires="c14">
@@ -4006,7 +4014,7 @@
 <file path=ppt/charts/chart24.xml><?xml version="1.0" encoding="utf-8"?>
 <c:chartSpace xmlns:c="http://schemas.openxmlformats.org/drawingml/2006/chart" xmlns:a="http://schemas.openxmlformats.org/drawingml/2006/main" xmlns:r="http://schemas.openxmlformats.org/officeDocument/2006/relationships" xmlns:c16r2="http://schemas.microsoft.com/office/drawing/2015/06/chart">
   <c:date1904 val="0"/>
-  <c:lang val="de-DE"/>
+  <c:lang val="en-US"/>
   <c:roundedCorners val="0"/>
   <mc:AlternateContent xmlns:mc="http://schemas.openxmlformats.org/markup-compatibility/2006">
     <mc:Choice xmlns:c14="http://schemas.microsoft.com/office/drawing/2007/8/2/chart" Requires="c14">
@@ -4369,7 +4377,7 @@
 <file path=ppt/charts/chart3.xml><?xml version="1.0" encoding="utf-8"?>
 <c:chartSpace xmlns:c="http://schemas.openxmlformats.org/drawingml/2006/chart" xmlns:a="http://schemas.openxmlformats.org/drawingml/2006/main" xmlns:r="http://schemas.openxmlformats.org/officeDocument/2006/relationships" xmlns:c16r2="http://schemas.microsoft.com/office/drawing/2015/06/chart">
   <c:date1904 val="0"/>
-  <c:lang val="de-DE"/>
+  <c:lang val="en-US"/>
   <c:roundedCorners val="0"/>
   <mc:AlternateContent xmlns:mc="http://schemas.openxmlformats.org/markup-compatibility/2006">
     <mc:Choice xmlns:c14="http://schemas.microsoft.com/office/drawing/2007/8/2/chart" Requires="c14">
@@ -4732,7 +4740,7 @@
 <file path=ppt/charts/chart4.xml><?xml version="1.0" encoding="utf-8"?>
 <c:chartSpace xmlns:c="http://schemas.openxmlformats.org/drawingml/2006/chart" xmlns:a="http://schemas.openxmlformats.org/drawingml/2006/main" xmlns:r="http://schemas.openxmlformats.org/officeDocument/2006/relationships" xmlns:c16r2="http://schemas.microsoft.com/office/drawing/2015/06/chart">
   <c:date1904 val="0"/>
-  <c:lang val="de-DE"/>
+  <c:lang val="en-US"/>
   <c:roundedCorners val="0"/>
   <mc:AlternateContent xmlns:mc="http://schemas.openxmlformats.org/markup-compatibility/2006">
     <mc:Choice xmlns:c14="http://schemas.microsoft.com/office/drawing/2007/8/2/chart" Requires="c14">
@@ -4934,7 +4942,7 @@
 <file path=ppt/charts/chart5.xml><?xml version="1.0" encoding="utf-8"?>
 <c:chartSpace xmlns:c="http://schemas.openxmlformats.org/drawingml/2006/chart" xmlns:a="http://schemas.openxmlformats.org/drawingml/2006/main" xmlns:r="http://schemas.openxmlformats.org/officeDocument/2006/relationships" xmlns:c16r2="http://schemas.microsoft.com/office/drawing/2015/06/chart">
   <c:date1904 val="0"/>
-  <c:lang val="de-DE"/>
+  <c:lang val="en-US"/>
   <c:roundedCorners val="0"/>
   <mc:AlternateContent xmlns:mc="http://schemas.openxmlformats.org/markup-compatibility/2006">
     <mc:Choice xmlns:c14="http://schemas.microsoft.com/office/drawing/2007/8/2/chart" Requires="c14">
@@ -5136,7 +5144,7 @@
 <file path=ppt/charts/chart6.xml><?xml version="1.0" encoding="utf-8"?>
 <c:chartSpace xmlns:c="http://schemas.openxmlformats.org/drawingml/2006/chart" xmlns:a="http://schemas.openxmlformats.org/drawingml/2006/main" xmlns:r="http://schemas.openxmlformats.org/officeDocument/2006/relationships" xmlns:c16r2="http://schemas.microsoft.com/office/drawing/2015/06/chart">
   <c:date1904 val="0"/>
-  <c:lang val="de-DE"/>
+  <c:lang val="en-US"/>
   <c:roundedCorners val="0"/>
   <mc:AlternateContent xmlns:mc="http://schemas.openxmlformats.org/markup-compatibility/2006">
     <mc:Choice xmlns:c14="http://schemas.microsoft.com/office/drawing/2007/8/2/chart" Requires="c14">
@@ -5499,7 +5507,7 @@
 <file path=ppt/charts/chart7.xml><?xml version="1.0" encoding="utf-8"?>
 <c:chartSpace xmlns:c="http://schemas.openxmlformats.org/drawingml/2006/chart" xmlns:a="http://schemas.openxmlformats.org/drawingml/2006/main" xmlns:r="http://schemas.openxmlformats.org/officeDocument/2006/relationships" xmlns:c16r2="http://schemas.microsoft.com/office/drawing/2015/06/chart">
   <c:date1904 val="0"/>
-  <c:lang val="de-DE"/>
+  <c:lang val="en-US"/>
   <c:roundedCorners val="0"/>
   <mc:AlternateContent xmlns:mc="http://schemas.openxmlformats.org/markup-compatibility/2006">
     <mc:Choice xmlns:c14="http://schemas.microsoft.com/office/drawing/2007/8/2/chart" Requires="c14">
@@ -5701,7 +5709,7 @@
 <file path=ppt/charts/chart8.xml><?xml version="1.0" encoding="utf-8"?>
 <c:chartSpace xmlns:c="http://schemas.openxmlformats.org/drawingml/2006/chart" xmlns:a="http://schemas.openxmlformats.org/drawingml/2006/main" xmlns:r="http://schemas.openxmlformats.org/officeDocument/2006/relationships" xmlns:c16r2="http://schemas.microsoft.com/office/drawing/2015/06/chart">
   <c:date1904 val="0"/>
-  <c:lang val="de-DE"/>
+  <c:lang val="en-US"/>
   <c:roundedCorners val="0"/>
   <mc:AlternateContent xmlns:mc="http://schemas.openxmlformats.org/markup-compatibility/2006">
     <mc:Choice xmlns:c14="http://schemas.microsoft.com/office/drawing/2007/8/2/chart" Requires="c14">
@@ -5903,7 +5911,7 @@
 <file path=ppt/charts/chart9.xml><?xml version="1.0" encoding="utf-8"?>
 <c:chartSpace xmlns:c="http://schemas.openxmlformats.org/drawingml/2006/chart" xmlns:a="http://schemas.openxmlformats.org/drawingml/2006/main" xmlns:r="http://schemas.openxmlformats.org/officeDocument/2006/relationships" xmlns:c16r2="http://schemas.microsoft.com/office/drawing/2015/06/chart">
   <c:date1904 val="0"/>
-  <c:lang val="de-DE"/>
+  <c:lang val="en-US"/>
   <c:roundedCorners val="0"/>
   <mc:AlternateContent xmlns:mc="http://schemas.openxmlformats.org/markup-compatibility/2006">
     <mc:Choice xmlns:c14="http://schemas.microsoft.com/office/drawing/2007/8/2/chart" Requires="c14">
@@ -19710,7 +19718,7 @@
           <a:p>
             <a:fld id="{2EFFAB5A-ADF3-439B-8358-8B18F84666B0}" type="datetimeFigureOut">
               <a:rPr lang="en-US" smtClean="0"/>
-              <a:t>5/7/2023</a:t>
+              <a:t>5/9/2023</a:t>
             </a:fld>
             <a:endParaRPr lang="en-US"/>
           </a:p>
@@ -19764,7 +19772,7 @@
           <a:p>
             <a:fld id="{C1FC57E4-EFC1-4C7B-9145-20B1A4B076F5}" type="slidenum">
               <a:rPr lang="en-US" smtClean="0"/>
-              <a:t>‹Nr.›</a:t>
+              <a:t>‹#›</a:t>
             </a:fld>
             <a:endParaRPr lang="en-US"/>
           </a:p>
@@ -19910,7 +19918,7 @@
           <a:p>
             <a:fld id="{2EFFAB5A-ADF3-439B-8358-8B18F84666B0}" type="datetimeFigureOut">
               <a:rPr lang="en-US" smtClean="0"/>
-              <a:t>5/7/2023</a:t>
+              <a:t>5/9/2023</a:t>
             </a:fld>
             <a:endParaRPr lang="en-US"/>
           </a:p>
@@ -19964,7 +19972,7 @@
           <a:p>
             <a:fld id="{C1FC57E4-EFC1-4C7B-9145-20B1A4B076F5}" type="slidenum">
               <a:rPr lang="en-US" smtClean="0"/>
-              <a:t>‹Nr.›</a:t>
+              <a:t>‹#›</a:t>
             </a:fld>
             <a:endParaRPr lang="en-US"/>
           </a:p>
@@ -20120,7 +20128,7 @@
           <a:p>
             <a:fld id="{2EFFAB5A-ADF3-439B-8358-8B18F84666B0}" type="datetimeFigureOut">
               <a:rPr lang="en-US" smtClean="0"/>
-              <a:t>5/7/2023</a:t>
+              <a:t>5/9/2023</a:t>
             </a:fld>
             <a:endParaRPr lang="en-US"/>
           </a:p>
@@ -20174,7 +20182,7 @@
           <a:p>
             <a:fld id="{C1FC57E4-EFC1-4C7B-9145-20B1A4B076F5}" type="slidenum">
               <a:rPr lang="en-US" smtClean="0"/>
-              <a:t>‹Nr.›</a:t>
+              <a:t>‹#›</a:t>
             </a:fld>
             <a:endParaRPr lang="en-US"/>
           </a:p>
@@ -20320,7 +20328,7 @@
           <a:p>
             <a:fld id="{2EFFAB5A-ADF3-439B-8358-8B18F84666B0}" type="datetimeFigureOut">
               <a:rPr lang="en-US" smtClean="0"/>
-              <a:t>5/7/2023</a:t>
+              <a:t>5/9/2023</a:t>
             </a:fld>
             <a:endParaRPr lang="en-US"/>
           </a:p>
@@ -20374,7 +20382,7 @@
           <a:p>
             <a:fld id="{C1FC57E4-EFC1-4C7B-9145-20B1A4B076F5}" type="slidenum">
               <a:rPr lang="en-US" smtClean="0"/>
-              <a:t>‹Nr.›</a:t>
+              <a:t>‹#›</a:t>
             </a:fld>
             <a:endParaRPr lang="en-US"/>
           </a:p>
@@ -20596,7 +20604,7 @@
           <a:p>
             <a:fld id="{2EFFAB5A-ADF3-439B-8358-8B18F84666B0}" type="datetimeFigureOut">
               <a:rPr lang="en-US" smtClean="0"/>
-              <a:t>5/7/2023</a:t>
+              <a:t>5/9/2023</a:t>
             </a:fld>
             <a:endParaRPr lang="en-US"/>
           </a:p>
@@ -20650,7 +20658,7 @@
           <a:p>
             <a:fld id="{C1FC57E4-EFC1-4C7B-9145-20B1A4B076F5}" type="slidenum">
               <a:rPr lang="en-US" smtClean="0"/>
-              <a:t>‹Nr.›</a:t>
+              <a:t>‹#›</a:t>
             </a:fld>
             <a:endParaRPr lang="en-US"/>
           </a:p>
@@ -20864,7 +20872,7 @@
           <a:p>
             <a:fld id="{2EFFAB5A-ADF3-439B-8358-8B18F84666B0}" type="datetimeFigureOut">
               <a:rPr lang="en-US" smtClean="0"/>
-              <a:t>5/7/2023</a:t>
+              <a:t>5/9/2023</a:t>
             </a:fld>
             <a:endParaRPr lang="en-US"/>
           </a:p>
@@ -20918,7 +20926,7 @@
           <a:p>
             <a:fld id="{C1FC57E4-EFC1-4C7B-9145-20B1A4B076F5}" type="slidenum">
               <a:rPr lang="en-US" smtClean="0"/>
-              <a:t>‹Nr.›</a:t>
+              <a:t>‹#›</a:t>
             </a:fld>
             <a:endParaRPr lang="en-US"/>
           </a:p>
@@ -21279,7 +21287,7 @@
           <a:p>
             <a:fld id="{2EFFAB5A-ADF3-439B-8358-8B18F84666B0}" type="datetimeFigureOut">
               <a:rPr lang="en-US" smtClean="0"/>
-              <a:t>5/7/2023</a:t>
+              <a:t>5/9/2023</a:t>
             </a:fld>
             <a:endParaRPr lang="en-US"/>
           </a:p>
@@ -21333,7 +21341,7 @@
           <a:p>
             <a:fld id="{C1FC57E4-EFC1-4C7B-9145-20B1A4B076F5}" type="slidenum">
               <a:rPr lang="en-US" smtClean="0"/>
-              <a:t>‹Nr.›</a:t>
+              <a:t>‹#›</a:t>
             </a:fld>
             <a:endParaRPr lang="en-US"/>
           </a:p>
@@ -21421,7 +21429,7 @@
           <a:p>
             <a:fld id="{2EFFAB5A-ADF3-439B-8358-8B18F84666B0}" type="datetimeFigureOut">
               <a:rPr lang="en-US" smtClean="0"/>
-              <a:t>5/7/2023</a:t>
+              <a:t>5/9/2023</a:t>
             </a:fld>
             <a:endParaRPr lang="en-US"/>
           </a:p>
@@ -21475,7 +21483,7 @@
           <a:p>
             <a:fld id="{C1FC57E4-EFC1-4C7B-9145-20B1A4B076F5}" type="slidenum">
               <a:rPr lang="en-US" smtClean="0"/>
-              <a:t>‹Nr.›</a:t>
+              <a:t>‹#›</a:t>
             </a:fld>
             <a:endParaRPr lang="en-US"/>
           </a:p>
@@ -21534,7 +21542,7 @@
           <a:p>
             <a:fld id="{2EFFAB5A-ADF3-439B-8358-8B18F84666B0}" type="datetimeFigureOut">
               <a:rPr lang="en-US" smtClean="0"/>
-              <a:t>5/7/2023</a:t>
+              <a:t>5/9/2023</a:t>
             </a:fld>
             <a:endParaRPr lang="en-US"/>
           </a:p>
@@ -21588,7 +21596,7 @@
           <a:p>
             <a:fld id="{C1FC57E4-EFC1-4C7B-9145-20B1A4B076F5}" type="slidenum">
               <a:rPr lang="en-US" smtClean="0"/>
-              <a:t>‹Nr.›</a:t>
+              <a:t>‹#›</a:t>
             </a:fld>
             <a:endParaRPr lang="en-US"/>
           </a:p>
@@ -21847,7 +21855,7 @@
           <a:p>
             <a:fld id="{2EFFAB5A-ADF3-439B-8358-8B18F84666B0}" type="datetimeFigureOut">
               <a:rPr lang="en-US" smtClean="0"/>
-              <a:t>5/7/2023</a:t>
+              <a:t>5/9/2023</a:t>
             </a:fld>
             <a:endParaRPr lang="en-US"/>
           </a:p>
@@ -21901,7 +21909,7 @@
           <a:p>
             <a:fld id="{C1FC57E4-EFC1-4C7B-9145-20B1A4B076F5}" type="slidenum">
               <a:rPr lang="en-US" smtClean="0"/>
-              <a:t>‹Nr.›</a:t>
+              <a:t>‹#›</a:t>
             </a:fld>
             <a:endParaRPr lang="en-US"/>
           </a:p>
@@ -22136,7 +22144,7 @@
           <a:p>
             <a:fld id="{2EFFAB5A-ADF3-439B-8358-8B18F84666B0}" type="datetimeFigureOut">
               <a:rPr lang="en-US" smtClean="0"/>
-              <a:t>5/7/2023</a:t>
+              <a:t>5/9/2023</a:t>
             </a:fld>
             <a:endParaRPr lang="en-US"/>
           </a:p>
@@ -22190,7 +22198,7 @@
           <a:p>
             <a:fld id="{C1FC57E4-EFC1-4C7B-9145-20B1A4B076F5}" type="slidenum">
               <a:rPr lang="en-US" smtClean="0"/>
-              <a:t>‹Nr.›</a:t>
+              <a:t>‹#›</a:t>
             </a:fld>
             <a:endParaRPr lang="en-US"/>
           </a:p>
@@ -22379,7 +22387,7 @@
           <a:p>
             <a:fld id="{2EFFAB5A-ADF3-439B-8358-8B18F84666B0}" type="datetimeFigureOut">
               <a:rPr lang="en-US" smtClean="0"/>
-              <a:t>5/7/2023</a:t>
+              <a:t>5/9/2023</a:t>
             </a:fld>
             <a:endParaRPr lang="en-US"/>
           </a:p>
@@ -22469,7 +22477,7 @@
           <a:p>
             <a:fld id="{C1FC57E4-EFC1-4C7B-9145-20B1A4B076F5}" type="slidenum">
               <a:rPr lang="en-US" smtClean="0"/>
-              <a:t>‹Nr.›</a:t>
+              <a:t>‹#›</a:t>
             </a:fld>
             <a:endParaRPr lang="en-US"/>
           </a:p>
@@ -25468,7 +25476,7 @@
           </a:ln>
         </p:spPr>
         <p:txBody>
-          <a:bodyPr wrap="square" rtlCol="0">
+          <a:bodyPr wrap="square" lIns="91440" tIns="45720" rIns="91440" bIns="45720" rtlCol="0" anchor="t">
             <a:spAutoFit/>
           </a:bodyPr>
           <a:lstStyle/>
@@ -25476,13 +25484,12 @@
             <a:pPr algn="ctr"/>
             <a:r>
               <a:rPr lang="de-DE" dirty="0"/>
-              <a:t>Namespace </a:t>
-            </a:r>
-            <a:r>
-              <a:rPr lang="de-DE" dirty="0" err="1"/>
-              <a:t>Overview</a:t>
-            </a:r>
-            <a:endParaRPr lang="de-DE" dirty="0"/>
+              <a:t>Cluster View</a:t>
+            </a:r>
+            <a:endParaRPr lang="de-DE" dirty="0">
+              <a:ea typeface="Calibri"/>
+              <a:cs typeface="Calibri"/>
+            </a:endParaRPr>
           </a:p>
           <a:p>
             <a:pPr algn="ctr"/>
@@ -25621,7 +25628,7 @@
           </a:ln>
         </p:spPr>
         <p:txBody>
-          <a:bodyPr wrap="square" rtlCol="0">
+          <a:bodyPr wrap="square" lIns="91440" tIns="45720" rIns="91440" bIns="45720" rtlCol="0" anchor="t">
             <a:spAutoFit/>
           </a:bodyPr>
           <a:lstStyle/>
@@ -25629,13 +25636,8 @@
             <a:pPr algn="ctr"/>
             <a:r>
               <a:rPr lang="de-DE" dirty="0"/>
-              <a:t>Namespace </a:t>
-            </a:r>
-            <a:r>
-              <a:rPr lang="de-DE" dirty="0" err="1"/>
-              <a:t>Overview</a:t>
-            </a:r>
-            <a:endParaRPr lang="de-DE" dirty="0"/>
+              <a:t>Namespace View</a:t>
+            </a:r>
           </a:p>
           <a:p>
             <a:pPr algn="ctr"/>
@@ -28615,7 +28617,7 @@
           </a:ln>
         </p:spPr>
         <p:txBody>
-          <a:bodyPr wrap="square" rtlCol="0">
+          <a:bodyPr wrap="square" lIns="91440" tIns="45720" rIns="91440" bIns="45720" rtlCol="0" anchor="t">
             <a:spAutoFit/>
           </a:bodyPr>
           <a:lstStyle/>
@@ -28623,13 +28625,8 @@
             <a:pPr algn="ctr"/>
             <a:r>
               <a:rPr lang="de-DE" dirty="0"/>
-              <a:t>Namespace </a:t>
-            </a:r>
-            <a:r>
-              <a:rPr lang="de-DE" dirty="0" err="1"/>
-              <a:t>Overview</a:t>
-            </a:r>
-            <a:endParaRPr lang="de-DE" dirty="0"/>
+              <a:t>Topic View</a:t>
+            </a:r>
           </a:p>
           <a:p>
             <a:pPr algn="ctr"/>
@@ -28768,7 +28765,7 @@
           </a:ln>
         </p:spPr>
         <p:txBody>
-          <a:bodyPr wrap="square" rtlCol="0">
+          <a:bodyPr wrap="square" lIns="91440" tIns="45720" rIns="91440" bIns="45720" rtlCol="0" anchor="t">
             <a:spAutoFit/>
           </a:bodyPr>
           <a:lstStyle/>
@@ -28776,13 +28773,8 @@
             <a:pPr algn="ctr"/>
             <a:r>
               <a:rPr lang="de-DE" dirty="0"/>
-              <a:t>Message </a:t>
-            </a:r>
-            <a:r>
-              <a:rPr lang="de-DE" dirty="0" err="1"/>
-              <a:t>Overview</a:t>
-            </a:r>
-            <a:endParaRPr lang="de-DE" dirty="0"/>
+              <a:t>Message View</a:t>
+            </a:r>
           </a:p>
           <a:p>
             <a:pPr algn="ctr"/>

</xml_diff>